<commit_message>
Updated lecture 15 slides
</commit_message>
<xml_diff>
--- a/lectures/15.Fluorescent.Labels.pptx
+++ b/lectures/15.Fluorescent.Labels.pptx
@@ -6,10 +6,10 @@
     <p:sldMasterId id="2147483660" r:id="rId2"/>
   </p:sldMasterIdLst>
   <p:notesMasterIdLst>
-    <p:notesMasterId r:id="rId22"/>
+    <p:notesMasterId r:id="rId21"/>
   </p:notesMasterIdLst>
   <p:handoutMasterIdLst>
-    <p:handoutMasterId r:id="rId23"/>
+    <p:handoutMasterId r:id="rId22"/>
   </p:handoutMasterIdLst>
   <p:sldIdLst>
     <p:sldId id="257" r:id="rId3"/>
@@ -28,9 +28,8 @@
     <p:sldId id="792" r:id="rId16"/>
     <p:sldId id="775" r:id="rId17"/>
     <p:sldId id="793" r:id="rId18"/>
-    <p:sldId id="794" r:id="rId19"/>
-    <p:sldId id="778" r:id="rId20"/>
-    <p:sldId id="787" r:id="rId21"/>
+    <p:sldId id="795" r:id="rId19"/>
+    <p:sldId id="794" r:id="rId20"/>
   </p:sldIdLst>
   <p:sldSz cx="9144000" cy="6858000" type="screen4x3"/>
   <p:notesSz cx="6858000" cy="9144000"/>
@@ -10670,6 +10669,262 @@
                 <a:ea typeface="Helvetica Neue" panose="02000503000000020004" pitchFamily="2" charset="0"/>
                 <a:cs typeface="Helvetica Neue" panose="02000503000000020004" pitchFamily="2" charset="0"/>
               </a:rPr>
+              <a:t>https://</a:t>
+            </a:r>
+            <a:r>
+              <a:rPr lang="en-US" sz="800" dirty="0" err="1">
+                <a:solidFill>
+                  <a:prstClr val="black"/>
+                </a:solidFill>
+                <a:latin typeface="Helvetica Neue" panose="02000503000000020004" pitchFamily="2" charset="0"/>
+                <a:ea typeface="Helvetica Neue" panose="02000503000000020004" pitchFamily="2" charset="0"/>
+                <a:cs typeface="Helvetica Neue" panose="02000503000000020004" pitchFamily="2" charset="0"/>
+              </a:rPr>
+              <a:t>en.m.wikipedia.org</a:t>
+            </a:r>
+            <a:r>
+              <a:rPr lang="en-US" sz="800" dirty="0">
+                <a:solidFill>
+                  <a:prstClr val="black"/>
+                </a:solidFill>
+                <a:latin typeface="Helvetica Neue" panose="02000503000000020004" pitchFamily="2" charset="0"/>
+                <a:ea typeface="Helvetica Neue" panose="02000503000000020004" pitchFamily="2" charset="0"/>
+                <a:cs typeface="Helvetica Neue" panose="02000503000000020004" pitchFamily="2" charset="0"/>
+              </a:rPr>
+              <a:t>/wiki/File:Steel_Jellyfish_%28GFP%29.jpg</a:t>
+            </a:r>
+          </a:p>
+        </p:txBody>
+      </p:sp>
+      <p:pic>
+        <p:nvPicPr>
+          <p:cNvPr id="3" name="Picture 2">
+            <a:extLst>
+              <a:ext uri="{FF2B5EF4-FFF2-40B4-BE49-F238E27FC236}">
+                <a16:creationId xmlns:a16="http://schemas.microsoft.com/office/drawing/2014/main" id="{722F10ED-B742-0040-CD6F-51E8ECAA3201}"/>
+              </a:ext>
+            </a:extLst>
+          </p:cNvPr>
+          <p:cNvPicPr>
+            <a:picLocks noChangeAspect="1" noChangeArrowheads="1"/>
+          </p:cNvPicPr>
+          <p:nvPr/>
+        </p:nvPicPr>
+        <p:blipFill>
+          <a:blip r:embed="rId2">
+            <a:extLst>
+              <a:ext uri="{28A0092B-C50C-407E-A947-70E740481C1C}">
+                <a14:useLocalDpi xmlns:a14="http://schemas.microsoft.com/office/drawing/2010/main" val="0"/>
+              </a:ext>
+            </a:extLst>
+          </a:blip>
+          <a:srcRect/>
+          <a:stretch>
+            <a:fillRect/>
+          </a:stretch>
+        </p:blipFill>
+        <p:spPr bwMode="auto">
+          <a:xfrm>
+            <a:off x="508000" y="1067751"/>
+            <a:ext cx="8128000" cy="5219700"/>
+          </a:xfrm>
+          <a:prstGeom prst="rect">
+            <a:avLst/>
+          </a:prstGeom>
+          <a:noFill/>
+          <a:extLst>
+            <a:ext uri="{909E8E84-426E-40DD-AFC4-6F175D3DCCD1}">
+              <a14:hiddenFill xmlns:a14="http://schemas.microsoft.com/office/drawing/2010/main">
+                <a:solidFill>
+                  <a:srgbClr val="FFFFFF"/>
+                </a:solidFill>
+              </a14:hiddenFill>
+            </a:ext>
+          </a:extLst>
+        </p:spPr>
+      </p:pic>
+    </p:spTree>
+    <p:extLst>
+      <p:ext uri="{BB962C8B-B14F-4D97-AF65-F5344CB8AC3E}">
+        <p14:creationId xmlns:p14="http://schemas.microsoft.com/office/powerpoint/2010/main" val="794039075"/>
+      </p:ext>
+    </p:extLst>
+  </p:cSld>
+  <p:clrMapOvr>
+    <a:masterClrMapping/>
+  </p:clrMapOvr>
+</p:sld>
+</file>
+
+<file path=ppt/slides/slide17.xml><?xml version="1.0" encoding="utf-8"?>
+<p:sld xmlns:a="http://schemas.openxmlformats.org/drawingml/2006/main" xmlns:r="http://schemas.openxmlformats.org/officeDocument/2006/relationships" xmlns:p="http://schemas.openxmlformats.org/presentationml/2006/main">
+  <p:cSld>
+    <p:spTree>
+      <p:nvGrpSpPr>
+        <p:cNvPr id="1" name=""/>
+        <p:cNvGrpSpPr/>
+        <p:nvPr/>
+      </p:nvGrpSpPr>
+      <p:grpSpPr>
+        <a:xfrm>
+          <a:off x="0" y="0"/>
+          <a:ext cx="0" cy="0"/>
+          <a:chOff x="0" y="0"/>
+          <a:chExt cx="0" cy="0"/>
+        </a:xfrm>
+      </p:grpSpPr>
+      <p:sp>
+        <p:nvSpPr>
+          <p:cNvPr id="4" name="Title 1"/>
+          <p:cNvSpPr txBox="1">
+            <a:spLocks/>
+          </p:cNvSpPr>
+          <p:nvPr/>
+        </p:nvSpPr>
+        <p:spPr>
+          <a:xfrm>
+            <a:off x="0" y="41589"/>
+            <a:ext cx="9144000" cy="1139825"/>
+          </a:xfrm>
+          <a:prstGeom prst="rect">
+            <a:avLst/>
+          </a:prstGeom>
+        </p:spPr>
+        <p:txBody>
+          <a:bodyPr vert="horz" lIns="91440" tIns="45720" rIns="91440" bIns="45720" rtlCol="0" anchor="ctr">
+            <a:normAutofit/>
+          </a:bodyPr>
+          <a:lstStyle>
+            <a:lvl1pPr algn="ctr" defTabSz="914400" rtl="0" eaLnBrk="1" latinLnBrk="0" hangingPunct="1">
+              <a:spcBef>
+                <a:spcPct val="0"/>
+              </a:spcBef>
+              <a:buNone/>
+              <a:defRPr sz="4400" kern="1200">
+                <a:solidFill>
+                  <a:schemeClr val="tx1"/>
+                </a:solidFill>
+                <a:latin typeface="+mj-lt"/>
+                <a:ea typeface="+mj-ea"/>
+                <a:cs typeface="+mj-cs"/>
+              </a:defRPr>
+            </a:lvl1pPr>
+          </a:lstStyle>
+          <a:p>
+            <a:pPr fontAlgn="auto">
+              <a:spcAft>
+                <a:spcPts val="0"/>
+              </a:spcAft>
+            </a:pPr>
+            <a:r>
+              <a:rPr lang="en-US" b="1" dirty="0">
+                <a:solidFill>
+                  <a:schemeClr val="tx1">
+                    <a:lumMod val="65000"/>
+                    <a:lumOff val="35000"/>
+                  </a:schemeClr>
+                </a:solidFill>
+                <a:latin typeface="Garamond" panose="02020404030301010803" pitchFamily="18" charset="0"/>
+              </a:rPr>
+              <a:t>Labels: Fluorescent proteins</a:t>
+            </a:r>
+          </a:p>
+        </p:txBody>
+      </p:sp>
+      <p:sp>
+        <p:nvSpPr>
+          <p:cNvPr id="2" name="Slide Number Placeholder 1">
+            <a:extLst>
+              <a:ext uri="{FF2B5EF4-FFF2-40B4-BE49-F238E27FC236}">
+                <a16:creationId xmlns:a16="http://schemas.microsoft.com/office/drawing/2014/main" id="{A67DA90B-656D-8349-8950-078AABAE1757}"/>
+              </a:ext>
+            </a:extLst>
+          </p:cNvPr>
+          <p:cNvSpPr>
+            <a:spLocks noGrp="1"/>
+          </p:cNvSpPr>
+          <p:nvPr>
+            <p:ph type="sldNum" sz="quarter" idx="12"/>
+          </p:nvPr>
+        </p:nvSpPr>
+        <p:spPr/>
+        <p:txBody>
+          <a:bodyPr/>
+          <a:lstStyle/>
+          <a:p>
+            <a:fld id="{1D3114E9-4222-4A72-8713-D3519DB6E1E0}" type="slidenum">
+              <a:rPr lang="en-US" smtClean="0">
+                <a:solidFill>
+                  <a:prstClr val="black">
+                    <a:tint val="75000"/>
+                  </a:prstClr>
+                </a:solidFill>
+              </a:rPr>
+              <a:pPr/>
+              <a:t>17</a:t>
+            </a:fld>
+            <a:endParaRPr lang="en-US">
+              <a:solidFill>
+                <a:prstClr val="black">
+                  <a:tint val="75000"/>
+                </a:prstClr>
+              </a:solidFill>
+            </a:endParaRPr>
+          </a:p>
+        </p:txBody>
+      </p:sp>
+      <p:sp>
+        <p:nvSpPr>
+          <p:cNvPr id="11" name="TextBox 10">
+            <a:extLst>
+              <a:ext uri="{FF2B5EF4-FFF2-40B4-BE49-F238E27FC236}">
+                <a16:creationId xmlns:a16="http://schemas.microsoft.com/office/drawing/2014/main" id="{611B79BE-780D-8C4A-BB19-CADB2C154A99}"/>
+              </a:ext>
+            </a:extLst>
+          </p:cNvPr>
+          <p:cNvSpPr txBox="1"/>
+          <p:nvPr/>
+        </p:nvSpPr>
+        <p:spPr>
+          <a:xfrm>
+            <a:off x="-1" y="6538912"/>
+            <a:ext cx="8686801" cy="319088"/>
+          </a:xfrm>
+          <a:prstGeom prst="rect">
+            <a:avLst/>
+          </a:prstGeom>
+          <a:noFill/>
+          <a:ln w="12700">
+            <a:noFill/>
+          </a:ln>
+        </p:spPr>
+        <p:txBody>
+          <a:bodyPr vert="horz" wrap="square" lIns="91440" tIns="45720" rIns="91440" bIns="45720" rtlCol="0">
+            <a:noAutofit/>
+          </a:bodyPr>
+          <a:lstStyle/>
+          <a:p>
+            <a:pPr fontAlgn="auto">
+              <a:spcBef>
+                <a:spcPts val="0"/>
+              </a:spcBef>
+              <a:spcAft>
+                <a:spcPts val="600"/>
+              </a:spcAft>
+              <a:buClr>
+                <a:srgbClr val="0070C0"/>
+              </a:buClr>
+              <a:buSzPct val="100000"/>
+            </a:pPr>
+            <a:r>
+              <a:rPr lang="en-US" sz="800" dirty="0">
+                <a:solidFill>
+                  <a:prstClr val="black"/>
+                </a:solidFill>
+                <a:latin typeface="Helvetica Neue" panose="02000503000000020004" pitchFamily="2" charset="0"/>
+                <a:ea typeface="Helvetica Neue" panose="02000503000000020004" pitchFamily="2" charset="0"/>
+                <a:cs typeface="Helvetica Neue" panose="02000503000000020004" pitchFamily="2" charset="0"/>
+              </a:rPr>
               <a:t>http://</a:t>
             </a:r>
             <a:r>
@@ -10884,7 +11139,7 @@
         </p:blipFill>
         <p:spPr bwMode="auto">
           <a:xfrm>
-            <a:off x="592527" y="1445930"/>
+            <a:off x="530651" y="1672889"/>
             <a:ext cx="2816152" cy="2816152"/>
           </a:xfrm>
           <a:prstGeom prst="rect">
@@ -10952,7 +11207,7 @@
     </p:spTree>
     <p:extLst>
       <p:ext uri="{BB962C8B-B14F-4D97-AF65-F5344CB8AC3E}">
-        <p14:creationId xmlns:p14="http://schemas.microsoft.com/office/powerpoint/2010/main" val="794039075"/>
+        <p14:creationId xmlns:p14="http://schemas.microsoft.com/office/powerpoint/2010/main" val="3701267326"/>
       </p:ext>
     </p:extLst>
   </p:cSld>
@@ -10962,7 +11217,7 @@
 </p:sld>
 </file>
 
-<file path=ppt/slides/slide17.xml><?xml version="1.0" encoding="utf-8"?>
+<file path=ppt/slides/slide18.xml><?xml version="1.0" encoding="utf-8"?>
 <p:sld xmlns:a="http://schemas.openxmlformats.org/drawingml/2006/main" xmlns:r="http://schemas.openxmlformats.org/officeDocument/2006/relationships" xmlns:p="http://schemas.openxmlformats.org/presentationml/2006/main">
   <p:cSld>
     <p:spTree>
@@ -11067,7 +11322,7 @@
                 </a:solidFill>
               </a:rPr>
               <a:pPr/>
-              <a:t>17</a:t>
+              <a:t>18</a:t>
             </a:fld>
             <a:endParaRPr lang="en-US">
               <a:solidFill>
@@ -11386,908 +11641,6 @@
     <p:extLst>
       <p:ext uri="{BB962C8B-B14F-4D97-AF65-F5344CB8AC3E}">
         <p14:creationId xmlns:p14="http://schemas.microsoft.com/office/powerpoint/2010/main" val="2055951128"/>
-      </p:ext>
-    </p:extLst>
-  </p:cSld>
-  <p:clrMapOvr>
-    <a:masterClrMapping/>
-  </p:clrMapOvr>
-</p:sld>
-</file>
-
-<file path=ppt/slides/slide18.xml><?xml version="1.0" encoding="utf-8"?>
-<p:sld xmlns:a="http://schemas.openxmlformats.org/drawingml/2006/main" xmlns:r="http://schemas.openxmlformats.org/officeDocument/2006/relationships" xmlns:p="http://schemas.openxmlformats.org/presentationml/2006/main">
-  <p:cSld>
-    <p:spTree>
-      <p:nvGrpSpPr>
-        <p:cNvPr id="1" name=""/>
-        <p:cNvGrpSpPr/>
-        <p:nvPr/>
-      </p:nvGrpSpPr>
-      <p:grpSpPr>
-        <a:xfrm>
-          <a:off x="0" y="0"/>
-          <a:ext cx="0" cy="0"/>
-          <a:chOff x="0" y="0"/>
-          <a:chExt cx="0" cy="0"/>
-        </a:xfrm>
-      </p:grpSpPr>
-      <p:pic>
-        <p:nvPicPr>
-          <p:cNvPr id="5" name="Picture 4">
-            <a:extLst>
-              <a:ext uri="{FF2B5EF4-FFF2-40B4-BE49-F238E27FC236}">
-                <a16:creationId xmlns:a16="http://schemas.microsoft.com/office/drawing/2014/main" id="{1948951D-6302-FB41-830B-2CB1E1DC733E}"/>
-              </a:ext>
-            </a:extLst>
-          </p:cNvPr>
-          <p:cNvPicPr>
-            <a:picLocks noChangeAspect="1"/>
-          </p:cNvPicPr>
-          <p:nvPr/>
-        </p:nvPicPr>
-        <p:blipFill>
-          <a:blip r:embed="rId2"/>
-          <a:stretch>
-            <a:fillRect/>
-          </a:stretch>
-        </p:blipFill>
-        <p:spPr>
-          <a:xfrm>
-            <a:off x="692995" y="3215113"/>
-            <a:ext cx="2785540" cy="3427058"/>
-          </a:xfrm>
-          <a:prstGeom prst="rect">
-            <a:avLst/>
-          </a:prstGeom>
-        </p:spPr>
-      </p:pic>
-      <p:sp>
-        <p:nvSpPr>
-          <p:cNvPr id="4" name="Title 1"/>
-          <p:cNvSpPr txBox="1">
-            <a:spLocks/>
-          </p:cNvSpPr>
-          <p:nvPr/>
-        </p:nvSpPr>
-        <p:spPr>
-          <a:xfrm>
-            <a:off x="0" y="41589"/>
-            <a:ext cx="9144000" cy="1139825"/>
-          </a:xfrm>
-          <a:prstGeom prst="rect">
-            <a:avLst/>
-          </a:prstGeom>
-        </p:spPr>
-        <p:txBody>
-          <a:bodyPr vert="horz" lIns="91440" tIns="45720" rIns="91440" bIns="45720" rtlCol="0" anchor="ctr">
-            <a:normAutofit/>
-          </a:bodyPr>
-          <a:lstStyle>
-            <a:lvl1pPr algn="ctr" defTabSz="914400" rtl="0" eaLnBrk="1" latinLnBrk="0" hangingPunct="1">
-              <a:spcBef>
-                <a:spcPct val="0"/>
-              </a:spcBef>
-              <a:buNone/>
-              <a:defRPr sz="4400" kern="1200">
-                <a:solidFill>
-                  <a:schemeClr val="tx1"/>
-                </a:solidFill>
-                <a:latin typeface="+mj-lt"/>
-                <a:ea typeface="+mj-ea"/>
-                <a:cs typeface="+mj-cs"/>
-              </a:defRPr>
-            </a:lvl1pPr>
-          </a:lstStyle>
-          <a:p>
-            <a:pPr fontAlgn="auto">
-              <a:spcAft>
-                <a:spcPts val="0"/>
-              </a:spcAft>
-            </a:pPr>
-            <a:r>
-              <a:rPr lang="en-US" sz="3600" b="1" dirty="0">
-                <a:solidFill>
-                  <a:schemeClr val="tx1">
-                    <a:lumMod val="65000"/>
-                    <a:lumOff val="35000"/>
-                  </a:schemeClr>
-                </a:solidFill>
-                <a:latin typeface="Garamond" panose="02020404030301010803" pitchFamily="18" charset="0"/>
-              </a:rPr>
-              <a:t>Class activity 1: Dye selection</a:t>
-            </a:r>
-          </a:p>
-        </p:txBody>
-      </p:sp>
-      <p:sp>
-        <p:nvSpPr>
-          <p:cNvPr id="2" name="Slide Number Placeholder 1">
-            <a:extLst>
-              <a:ext uri="{FF2B5EF4-FFF2-40B4-BE49-F238E27FC236}">
-                <a16:creationId xmlns:a16="http://schemas.microsoft.com/office/drawing/2014/main" id="{A67DA90B-656D-8349-8950-078AABAE1757}"/>
-              </a:ext>
-            </a:extLst>
-          </p:cNvPr>
-          <p:cNvSpPr>
-            <a:spLocks noGrp="1"/>
-          </p:cNvSpPr>
-          <p:nvPr>
-            <p:ph type="sldNum" sz="quarter" idx="12"/>
-          </p:nvPr>
-        </p:nvSpPr>
-        <p:spPr/>
-        <p:txBody>
-          <a:bodyPr/>
-          <a:lstStyle/>
-          <a:p>
-            <a:fld id="{1D3114E9-4222-4A72-8713-D3519DB6E1E0}" type="slidenum">
-              <a:rPr lang="en-US" smtClean="0">
-                <a:solidFill>
-                  <a:prstClr val="black">
-                    <a:tint val="75000"/>
-                  </a:prstClr>
-                </a:solidFill>
-              </a:rPr>
-              <a:pPr/>
-              <a:t>18</a:t>
-            </a:fld>
-            <a:endParaRPr lang="en-US">
-              <a:solidFill>
-                <a:prstClr val="black">
-                  <a:tint val="75000"/>
-                </a:prstClr>
-              </a:solidFill>
-            </a:endParaRPr>
-          </a:p>
-        </p:txBody>
-      </p:sp>
-      <p:sp>
-        <p:nvSpPr>
-          <p:cNvPr id="3" name="Rectangle 2">
-            <a:extLst>
-              <a:ext uri="{FF2B5EF4-FFF2-40B4-BE49-F238E27FC236}">
-                <a16:creationId xmlns:a16="http://schemas.microsoft.com/office/drawing/2014/main" id="{6AE1CA03-7315-FC4B-AAE7-7ACB5C0F0B1E}"/>
-              </a:ext>
-            </a:extLst>
-          </p:cNvPr>
-          <p:cNvSpPr/>
-          <p:nvPr/>
-        </p:nvSpPr>
-        <p:spPr>
-          <a:xfrm>
-            <a:off x="6092488" y="2823882"/>
-            <a:ext cx="2104760" cy="2104760"/>
-          </a:xfrm>
-          <a:prstGeom prst="rect">
-            <a:avLst/>
-          </a:prstGeom>
-          <a:noFill/>
-          <a:ln w="57150">
-            <a:solidFill>
-              <a:schemeClr val="bg1"/>
-            </a:solidFill>
-          </a:ln>
-        </p:spPr>
-        <p:style>
-          <a:lnRef idx="2">
-            <a:schemeClr val="accent1">
-              <a:shade val="50000"/>
-            </a:schemeClr>
-          </a:lnRef>
-          <a:fillRef idx="1">
-            <a:schemeClr val="accent1"/>
-          </a:fillRef>
-          <a:effectRef idx="0">
-            <a:schemeClr val="accent1"/>
-          </a:effectRef>
-          <a:fontRef idx="minor">
-            <a:schemeClr val="lt1"/>
-          </a:fontRef>
-        </p:style>
-        <p:txBody>
-          <a:bodyPr rtlCol="0" anchor="ctr"/>
-          <a:lstStyle/>
-          <a:p>
-            <a:pPr algn="ctr"/>
-            <a:endParaRPr lang="en-US"/>
-          </a:p>
-        </p:txBody>
-      </p:sp>
-      <p:sp>
-        <p:nvSpPr>
-          <p:cNvPr id="11" name="TextBox 10">
-            <a:extLst>
-              <a:ext uri="{FF2B5EF4-FFF2-40B4-BE49-F238E27FC236}">
-                <a16:creationId xmlns:a16="http://schemas.microsoft.com/office/drawing/2014/main" id="{FC377E65-977D-1E4F-81AE-23CE03B03DA6}"/>
-              </a:ext>
-            </a:extLst>
-          </p:cNvPr>
-          <p:cNvSpPr txBox="1"/>
-          <p:nvPr/>
-        </p:nvSpPr>
-        <p:spPr>
-          <a:xfrm>
-            <a:off x="198224" y="913616"/>
-            <a:ext cx="8488576" cy="2515383"/>
-          </a:xfrm>
-          <a:prstGeom prst="rect">
-            <a:avLst/>
-          </a:prstGeom>
-          <a:noFill/>
-          <a:ln w="12700">
-            <a:noFill/>
-          </a:ln>
-        </p:spPr>
-        <p:txBody>
-          <a:bodyPr vert="horz" wrap="square" lIns="91440" tIns="45720" rIns="91440" bIns="45720" rtlCol="0">
-            <a:noAutofit/>
-          </a:bodyPr>
-          <a:lstStyle/>
-          <a:p>
-            <a:pPr marL="342900" indent="-342900" fontAlgn="auto">
-              <a:spcBef>
-                <a:spcPts val="0"/>
-              </a:spcBef>
-              <a:spcAft>
-                <a:spcPts val="0"/>
-              </a:spcAft>
-              <a:buClr>
-                <a:schemeClr val="bg1">
-                  <a:lumMod val="50000"/>
-                </a:schemeClr>
-              </a:buClr>
-              <a:buSzPct val="100000"/>
-              <a:buFont typeface="Arial" panose="020B0604020202020204" pitchFamily="34" charset="0"/>
-              <a:buChar char="•"/>
-            </a:pPr>
-            <a:r>
-              <a:rPr lang="en-US" dirty="0">
-                <a:latin typeface="Helvetica Neue" panose="02000503000000020004" pitchFamily="2" charset="0"/>
-                <a:ea typeface="Helvetica Neue" panose="02000503000000020004" pitchFamily="2" charset="0"/>
-                <a:cs typeface="Helvetica Neue" panose="02000503000000020004" pitchFamily="2" charset="0"/>
-              </a:rPr>
-              <a:t>Go to </a:t>
-            </a:r>
-            <a:r>
-              <a:rPr lang="en-US" dirty="0">
-                <a:latin typeface="Helvetica Neue" panose="02000503000000020004" pitchFamily="2" charset="0"/>
-                <a:ea typeface="Helvetica Neue" panose="02000503000000020004" pitchFamily="2" charset="0"/>
-                <a:cs typeface="Helvetica Neue" panose="02000503000000020004" pitchFamily="2" charset="0"/>
-                <a:hlinkClick r:id="rId3"/>
-              </a:rPr>
-              <a:t>https://www.fpbase.org/spectra/</a:t>
-            </a:r>
-            <a:r>
-              <a:rPr lang="en-US" dirty="0">
-                <a:latin typeface="Helvetica Neue" panose="02000503000000020004" pitchFamily="2" charset="0"/>
-                <a:ea typeface="Helvetica Neue" panose="02000503000000020004" pitchFamily="2" charset="0"/>
-                <a:cs typeface="Helvetica Neue" panose="02000503000000020004" pitchFamily="2" charset="0"/>
-              </a:rPr>
-              <a:t> and add the filters and light sources below</a:t>
-            </a:r>
-          </a:p>
-          <a:p>
-            <a:pPr fontAlgn="auto">
-              <a:spcBef>
-                <a:spcPts val="0"/>
-              </a:spcBef>
-              <a:spcAft>
-                <a:spcPts val="0"/>
-              </a:spcAft>
-              <a:buClr>
-                <a:schemeClr val="bg1">
-                  <a:lumMod val="50000"/>
-                </a:schemeClr>
-              </a:buClr>
-              <a:buSzPct val="100000"/>
-            </a:pPr>
-            <a:endParaRPr lang="en-US" dirty="0">
-              <a:latin typeface="Helvetica Neue" panose="02000503000000020004" pitchFamily="2" charset="0"/>
-              <a:ea typeface="Helvetica Neue" panose="02000503000000020004" pitchFamily="2" charset="0"/>
-              <a:cs typeface="Helvetica Neue" panose="02000503000000020004" pitchFamily="2" charset="0"/>
-            </a:endParaRPr>
-          </a:p>
-          <a:p>
-            <a:pPr marL="342900" indent="-342900" fontAlgn="auto">
-              <a:spcBef>
-                <a:spcPts val="0"/>
-              </a:spcBef>
-              <a:spcAft>
-                <a:spcPts val="0"/>
-              </a:spcAft>
-              <a:buClr>
-                <a:schemeClr val="bg1">
-                  <a:lumMod val="50000"/>
-                </a:schemeClr>
-              </a:buClr>
-              <a:buSzPct val="100000"/>
-              <a:buFont typeface="Arial" panose="020B0604020202020204" pitchFamily="34" charset="0"/>
-              <a:buChar char="•"/>
-            </a:pPr>
-            <a:r>
-              <a:rPr lang="en-US" dirty="0">
-                <a:latin typeface="Helvetica Neue" panose="02000503000000020004" pitchFamily="2" charset="0"/>
-                <a:ea typeface="Helvetica Neue" panose="02000503000000020004" pitchFamily="2" charset="0"/>
-                <a:cs typeface="Helvetica Neue" panose="02000503000000020004" pitchFamily="2" charset="0"/>
-              </a:rPr>
-              <a:t>Select one ATTO or Alexa Fluor dye for the “Cyan”, “</a:t>
-            </a:r>
-            <a:r>
-              <a:rPr lang="en-US" dirty="0" err="1">
-                <a:latin typeface="Helvetica Neue" panose="02000503000000020004" pitchFamily="2" charset="0"/>
-                <a:ea typeface="Helvetica Neue" panose="02000503000000020004" pitchFamily="2" charset="0"/>
-                <a:cs typeface="Helvetica Neue" panose="02000503000000020004" pitchFamily="2" charset="0"/>
-              </a:rPr>
-              <a:t>GreenYellow</a:t>
-            </a:r>
-            <a:r>
-              <a:rPr lang="en-US" dirty="0">
-                <a:latin typeface="Helvetica Neue" panose="02000503000000020004" pitchFamily="2" charset="0"/>
-                <a:ea typeface="Helvetica Neue" panose="02000503000000020004" pitchFamily="2" charset="0"/>
-                <a:cs typeface="Helvetica Neue" panose="02000503000000020004" pitchFamily="2" charset="0"/>
-              </a:rPr>
-              <a:t>”, and “Red” channels. Add “DAPI” for “Violet”</a:t>
-            </a:r>
-          </a:p>
-          <a:p>
-            <a:pPr marL="342900" indent="-342900" fontAlgn="auto">
-              <a:spcBef>
-                <a:spcPts val="0"/>
-              </a:spcBef>
-              <a:spcAft>
-                <a:spcPts val="0"/>
-              </a:spcAft>
-              <a:buClr>
-                <a:schemeClr val="bg1">
-                  <a:lumMod val="50000"/>
-                </a:schemeClr>
-              </a:buClr>
-              <a:buSzPct val="100000"/>
-              <a:buFont typeface="Arial" panose="020B0604020202020204" pitchFamily="34" charset="0"/>
-              <a:buChar char="•"/>
-            </a:pPr>
-            <a:endParaRPr lang="en-US" dirty="0">
-              <a:latin typeface="Helvetica Neue" panose="02000503000000020004" pitchFamily="2" charset="0"/>
-              <a:ea typeface="Helvetica Neue" panose="02000503000000020004" pitchFamily="2" charset="0"/>
-              <a:cs typeface="Helvetica Neue" panose="02000503000000020004" pitchFamily="2" charset="0"/>
-            </a:endParaRPr>
-          </a:p>
-          <a:p>
-            <a:pPr marL="342900" indent="-342900" fontAlgn="auto">
-              <a:spcBef>
-                <a:spcPts val="0"/>
-              </a:spcBef>
-              <a:spcAft>
-                <a:spcPts val="0"/>
-              </a:spcAft>
-              <a:buClr>
-                <a:schemeClr val="bg1">
-                  <a:lumMod val="50000"/>
-                </a:schemeClr>
-              </a:buClr>
-              <a:buSzPct val="100000"/>
-              <a:buFont typeface="Arial" panose="020B0604020202020204" pitchFamily="34" charset="0"/>
-              <a:buChar char="•"/>
-            </a:pPr>
-            <a:r>
-              <a:rPr lang="en-US" dirty="0">
-                <a:latin typeface="Helvetica Neue" panose="02000503000000020004" pitchFamily="2" charset="0"/>
-                <a:ea typeface="Helvetica Neue" panose="02000503000000020004" pitchFamily="2" charset="0"/>
-                <a:cs typeface="Helvetica Neue" panose="02000503000000020004" pitchFamily="2" charset="0"/>
-              </a:rPr>
-              <a:t>Aim to balance excitation and emission efficiencies. Calculate “arbitrary brightness units” for each: Ex. % * brightness * Collection %</a:t>
-            </a:r>
-          </a:p>
-        </p:txBody>
-      </p:sp>
-      <p:pic>
-        <p:nvPicPr>
-          <p:cNvPr id="6" name="Picture 5">
-            <a:extLst>
-              <a:ext uri="{FF2B5EF4-FFF2-40B4-BE49-F238E27FC236}">
-                <a16:creationId xmlns:a16="http://schemas.microsoft.com/office/drawing/2014/main" id="{60E2EFA9-3176-5F43-BAD8-C4561123D46C}"/>
-              </a:ext>
-            </a:extLst>
-          </p:cNvPr>
-          <p:cNvPicPr>
-            <a:picLocks noChangeAspect="1"/>
-          </p:cNvPicPr>
-          <p:nvPr/>
-        </p:nvPicPr>
-        <p:blipFill>
-          <a:blip r:embed="rId4"/>
-          <a:stretch>
-            <a:fillRect/>
-          </a:stretch>
-        </p:blipFill>
-        <p:spPr>
-          <a:xfrm>
-            <a:off x="4417899" y="3338914"/>
-            <a:ext cx="2495136" cy="3179456"/>
-          </a:xfrm>
-          <a:prstGeom prst="rect">
-            <a:avLst/>
-          </a:prstGeom>
-        </p:spPr>
-      </p:pic>
-    </p:spTree>
-    <p:extLst>
-      <p:ext uri="{BB962C8B-B14F-4D97-AF65-F5344CB8AC3E}">
-        <p14:creationId xmlns:p14="http://schemas.microsoft.com/office/powerpoint/2010/main" val="3209899167"/>
-      </p:ext>
-    </p:extLst>
-  </p:cSld>
-  <p:clrMapOvr>
-    <a:masterClrMapping/>
-  </p:clrMapOvr>
-</p:sld>
-</file>
-
-<file path=ppt/slides/slide19.xml><?xml version="1.0" encoding="utf-8"?>
-<p:sld xmlns:a="http://schemas.openxmlformats.org/drawingml/2006/main" xmlns:r="http://schemas.openxmlformats.org/officeDocument/2006/relationships" xmlns:p="http://schemas.openxmlformats.org/presentationml/2006/main">
-  <p:cSld>
-    <p:spTree>
-      <p:nvGrpSpPr>
-        <p:cNvPr id="1" name=""/>
-        <p:cNvGrpSpPr/>
-        <p:nvPr/>
-      </p:nvGrpSpPr>
-      <p:grpSpPr>
-        <a:xfrm>
-          <a:off x="0" y="0"/>
-          <a:ext cx="0" cy="0"/>
-          <a:chOff x="0" y="0"/>
-          <a:chExt cx="0" cy="0"/>
-        </a:xfrm>
-      </p:grpSpPr>
-      <p:pic>
-        <p:nvPicPr>
-          <p:cNvPr id="5" name="Picture 4">
-            <a:extLst>
-              <a:ext uri="{FF2B5EF4-FFF2-40B4-BE49-F238E27FC236}">
-                <a16:creationId xmlns:a16="http://schemas.microsoft.com/office/drawing/2014/main" id="{1948951D-6302-FB41-830B-2CB1E1DC733E}"/>
-              </a:ext>
-            </a:extLst>
-          </p:cNvPr>
-          <p:cNvPicPr>
-            <a:picLocks noChangeAspect="1"/>
-          </p:cNvPicPr>
-          <p:nvPr/>
-        </p:nvPicPr>
-        <p:blipFill>
-          <a:blip r:embed="rId2"/>
-          <a:stretch>
-            <a:fillRect/>
-          </a:stretch>
-        </p:blipFill>
-        <p:spPr>
-          <a:xfrm>
-            <a:off x="692995" y="3215113"/>
-            <a:ext cx="2785540" cy="3427058"/>
-          </a:xfrm>
-          <a:prstGeom prst="rect">
-            <a:avLst/>
-          </a:prstGeom>
-        </p:spPr>
-      </p:pic>
-      <p:sp>
-        <p:nvSpPr>
-          <p:cNvPr id="4" name="Title 1"/>
-          <p:cNvSpPr txBox="1">
-            <a:spLocks/>
-          </p:cNvSpPr>
-          <p:nvPr/>
-        </p:nvSpPr>
-        <p:spPr>
-          <a:xfrm>
-            <a:off x="0" y="41589"/>
-            <a:ext cx="9144000" cy="1139825"/>
-          </a:xfrm>
-          <a:prstGeom prst="rect">
-            <a:avLst/>
-          </a:prstGeom>
-        </p:spPr>
-        <p:txBody>
-          <a:bodyPr vert="horz" lIns="91440" tIns="45720" rIns="91440" bIns="45720" rtlCol="0" anchor="ctr">
-            <a:normAutofit/>
-          </a:bodyPr>
-          <a:lstStyle>
-            <a:lvl1pPr algn="ctr" defTabSz="914400" rtl="0" eaLnBrk="1" latinLnBrk="0" hangingPunct="1">
-              <a:spcBef>
-                <a:spcPct val="0"/>
-              </a:spcBef>
-              <a:buNone/>
-              <a:defRPr sz="4400" kern="1200">
-                <a:solidFill>
-                  <a:schemeClr val="tx1"/>
-                </a:solidFill>
-                <a:latin typeface="+mj-lt"/>
-                <a:ea typeface="+mj-ea"/>
-                <a:cs typeface="+mj-cs"/>
-              </a:defRPr>
-            </a:lvl1pPr>
-          </a:lstStyle>
-          <a:p>
-            <a:pPr fontAlgn="auto">
-              <a:spcAft>
-                <a:spcPts val="0"/>
-              </a:spcAft>
-            </a:pPr>
-            <a:r>
-              <a:rPr lang="en-US" sz="3600" b="1" dirty="0">
-                <a:solidFill>
-                  <a:schemeClr val="tx1">
-                    <a:lumMod val="65000"/>
-                    <a:lumOff val="35000"/>
-                  </a:schemeClr>
-                </a:solidFill>
-                <a:latin typeface="Garamond" panose="02020404030301010803" pitchFamily="18" charset="0"/>
-              </a:rPr>
-              <a:t>Class activity 2: FP </a:t>
-            </a:r>
-            <a:r>
-              <a:rPr lang="en-US" sz="3600" b="1" dirty="0" err="1">
-                <a:solidFill>
-                  <a:schemeClr val="tx1">
-                    <a:lumMod val="65000"/>
-                    <a:lumOff val="35000"/>
-                  </a:schemeClr>
-                </a:solidFill>
-                <a:latin typeface="Garamond" panose="02020404030301010803" pitchFamily="18" charset="0"/>
-              </a:rPr>
-              <a:t>slection</a:t>
-            </a:r>
-            <a:endParaRPr lang="en-US" sz="3600" b="1" dirty="0">
-              <a:solidFill>
-                <a:schemeClr val="tx1">
-                  <a:lumMod val="65000"/>
-                  <a:lumOff val="35000"/>
-                </a:schemeClr>
-              </a:solidFill>
-              <a:latin typeface="Garamond" panose="02020404030301010803" pitchFamily="18" charset="0"/>
-            </a:endParaRPr>
-          </a:p>
-        </p:txBody>
-      </p:sp>
-      <p:sp>
-        <p:nvSpPr>
-          <p:cNvPr id="2" name="Slide Number Placeholder 1">
-            <a:extLst>
-              <a:ext uri="{FF2B5EF4-FFF2-40B4-BE49-F238E27FC236}">
-                <a16:creationId xmlns:a16="http://schemas.microsoft.com/office/drawing/2014/main" id="{A67DA90B-656D-8349-8950-078AABAE1757}"/>
-              </a:ext>
-            </a:extLst>
-          </p:cNvPr>
-          <p:cNvSpPr>
-            <a:spLocks noGrp="1"/>
-          </p:cNvSpPr>
-          <p:nvPr>
-            <p:ph type="sldNum" sz="quarter" idx="12"/>
-          </p:nvPr>
-        </p:nvSpPr>
-        <p:spPr/>
-        <p:txBody>
-          <a:bodyPr/>
-          <a:lstStyle/>
-          <a:p>
-            <a:fld id="{1D3114E9-4222-4A72-8713-D3519DB6E1E0}" type="slidenum">
-              <a:rPr lang="en-US" smtClean="0">
-                <a:solidFill>
-                  <a:prstClr val="black">
-                    <a:tint val="75000"/>
-                  </a:prstClr>
-                </a:solidFill>
-              </a:rPr>
-              <a:pPr/>
-              <a:t>19</a:t>
-            </a:fld>
-            <a:endParaRPr lang="en-US">
-              <a:solidFill>
-                <a:prstClr val="black">
-                  <a:tint val="75000"/>
-                </a:prstClr>
-              </a:solidFill>
-            </a:endParaRPr>
-          </a:p>
-        </p:txBody>
-      </p:sp>
-      <p:sp>
-        <p:nvSpPr>
-          <p:cNvPr id="3" name="Rectangle 2">
-            <a:extLst>
-              <a:ext uri="{FF2B5EF4-FFF2-40B4-BE49-F238E27FC236}">
-                <a16:creationId xmlns:a16="http://schemas.microsoft.com/office/drawing/2014/main" id="{6AE1CA03-7315-FC4B-AAE7-7ACB5C0F0B1E}"/>
-              </a:ext>
-            </a:extLst>
-          </p:cNvPr>
-          <p:cNvSpPr/>
-          <p:nvPr/>
-        </p:nvSpPr>
-        <p:spPr>
-          <a:xfrm>
-            <a:off x="6092488" y="2823882"/>
-            <a:ext cx="2104760" cy="2104760"/>
-          </a:xfrm>
-          <a:prstGeom prst="rect">
-            <a:avLst/>
-          </a:prstGeom>
-          <a:noFill/>
-          <a:ln w="57150">
-            <a:solidFill>
-              <a:schemeClr val="bg1"/>
-            </a:solidFill>
-          </a:ln>
-        </p:spPr>
-        <p:style>
-          <a:lnRef idx="2">
-            <a:schemeClr val="accent1">
-              <a:shade val="50000"/>
-            </a:schemeClr>
-          </a:lnRef>
-          <a:fillRef idx="1">
-            <a:schemeClr val="accent1"/>
-          </a:fillRef>
-          <a:effectRef idx="0">
-            <a:schemeClr val="accent1"/>
-          </a:effectRef>
-          <a:fontRef idx="minor">
-            <a:schemeClr val="lt1"/>
-          </a:fontRef>
-        </p:style>
-        <p:txBody>
-          <a:bodyPr rtlCol="0" anchor="ctr"/>
-          <a:lstStyle/>
-          <a:p>
-            <a:pPr algn="ctr"/>
-            <a:endParaRPr lang="en-US"/>
-          </a:p>
-        </p:txBody>
-      </p:sp>
-      <p:sp>
-        <p:nvSpPr>
-          <p:cNvPr id="11" name="TextBox 10">
-            <a:extLst>
-              <a:ext uri="{FF2B5EF4-FFF2-40B4-BE49-F238E27FC236}">
-                <a16:creationId xmlns:a16="http://schemas.microsoft.com/office/drawing/2014/main" id="{FC377E65-977D-1E4F-81AE-23CE03B03DA6}"/>
-              </a:ext>
-            </a:extLst>
-          </p:cNvPr>
-          <p:cNvSpPr txBox="1"/>
-          <p:nvPr/>
-        </p:nvSpPr>
-        <p:spPr>
-          <a:xfrm>
-            <a:off x="198224" y="913616"/>
-            <a:ext cx="8488576" cy="2515383"/>
-          </a:xfrm>
-          <a:prstGeom prst="rect">
-            <a:avLst/>
-          </a:prstGeom>
-          <a:noFill/>
-          <a:ln w="12700">
-            <a:noFill/>
-          </a:ln>
-        </p:spPr>
-        <p:txBody>
-          <a:bodyPr vert="horz" wrap="square" lIns="91440" tIns="45720" rIns="91440" bIns="45720" rtlCol="0">
-            <a:noAutofit/>
-          </a:bodyPr>
-          <a:lstStyle/>
-          <a:p>
-            <a:pPr marL="342900" indent="-342900" fontAlgn="auto">
-              <a:spcBef>
-                <a:spcPts val="0"/>
-              </a:spcBef>
-              <a:spcAft>
-                <a:spcPts val="0"/>
-              </a:spcAft>
-              <a:buClr>
-                <a:schemeClr val="bg1">
-                  <a:lumMod val="50000"/>
-                </a:schemeClr>
-              </a:buClr>
-              <a:buSzPct val="100000"/>
-              <a:buFont typeface="Arial" panose="020B0604020202020204" pitchFamily="34" charset="0"/>
-              <a:buChar char="•"/>
-            </a:pPr>
-            <a:r>
-              <a:rPr lang="en-US" sz="2200" dirty="0">
-                <a:latin typeface="Helvetica Neue" panose="02000503000000020004" pitchFamily="2" charset="0"/>
-                <a:ea typeface="Helvetica Neue" panose="02000503000000020004" pitchFamily="2" charset="0"/>
-                <a:cs typeface="Helvetica Neue" panose="02000503000000020004" pitchFamily="2" charset="0"/>
-              </a:rPr>
-              <a:t>Go to </a:t>
-            </a:r>
-            <a:r>
-              <a:rPr lang="en-US" sz="2200" dirty="0">
-                <a:latin typeface="Helvetica Neue" panose="02000503000000020004" pitchFamily="2" charset="0"/>
-                <a:ea typeface="Helvetica Neue" panose="02000503000000020004" pitchFamily="2" charset="0"/>
-                <a:cs typeface="Helvetica Neue" panose="02000503000000020004" pitchFamily="2" charset="0"/>
-                <a:hlinkClick r:id="rId3"/>
-              </a:rPr>
-              <a:t>https://www.fpbase.org/spectra/</a:t>
-            </a:r>
-            <a:r>
-              <a:rPr lang="en-US" sz="2200" dirty="0">
-                <a:latin typeface="Helvetica Neue" panose="02000503000000020004" pitchFamily="2" charset="0"/>
-                <a:ea typeface="Helvetica Neue" panose="02000503000000020004" pitchFamily="2" charset="0"/>
-                <a:cs typeface="Helvetica Neue" panose="02000503000000020004" pitchFamily="2" charset="0"/>
-              </a:rPr>
-              <a:t> and add the filters and light sources below</a:t>
-            </a:r>
-          </a:p>
-          <a:p>
-            <a:pPr fontAlgn="auto">
-              <a:spcBef>
-                <a:spcPts val="0"/>
-              </a:spcBef>
-              <a:spcAft>
-                <a:spcPts val="0"/>
-              </a:spcAft>
-              <a:buClr>
-                <a:schemeClr val="bg1">
-                  <a:lumMod val="50000"/>
-                </a:schemeClr>
-              </a:buClr>
-              <a:buSzPct val="100000"/>
-            </a:pPr>
-            <a:endParaRPr lang="en-US" sz="2200" dirty="0">
-              <a:latin typeface="Helvetica Neue" panose="02000503000000020004" pitchFamily="2" charset="0"/>
-              <a:ea typeface="Helvetica Neue" panose="02000503000000020004" pitchFamily="2" charset="0"/>
-              <a:cs typeface="Helvetica Neue" panose="02000503000000020004" pitchFamily="2" charset="0"/>
-            </a:endParaRPr>
-          </a:p>
-          <a:p>
-            <a:pPr marL="342900" indent="-342900" fontAlgn="auto">
-              <a:spcBef>
-                <a:spcPts val="0"/>
-              </a:spcBef>
-              <a:spcAft>
-                <a:spcPts val="0"/>
-              </a:spcAft>
-              <a:buClr>
-                <a:schemeClr val="bg1">
-                  <a:lumMod val="50000"/>
-                </a:schemeClr>
-              </a:buClr>
-              <a:buSzPct val="100000"/>
-              <a:buFont typeface="Arial" panose="020B0604020202020204" pitchFamily="34" charset="0"/>
-              <a:buChar char="•"/>
-            </a:pPr>
-            <a:r>
-              <a:rPr lang="en-US" sz="2200" dirty="0">
-                <a:latin typeface="Helvetica Neue" panose="02000503000000020004" pitchFamily="2" charset="0"/>
-                <a:ea typeface="Helvetica Neue" panose="02000503000000020004" pitchFamily="2" charset="0"/>
-                <a:cs typeface="Helvetica Neue" panose="02000503000000020004" pitchFamily="2" charset="0"/>
-              </a:rPr>
-              <a:t>Select one fluorescent protein for the “Cyan”, “</a:t>
-            </a:r>
-            <a:r>
-              <a:rPr lang="en-US" sz="2200" dirty="0" err="1">
-                <a:latin typeface="Helvetica Neue" panose="02000503000000020004" pitchFamily="2" charset="0"/>
-                <a:ea typeface="Helvetica Neue" panose="02000503000000020004" pitchFamily="2" charset="0"/>
-                <a:cs typeface="Helvetica Neue" panose="02000503000000020004" pitchFamily="2" charset="0"/>
-              </a:rPr>
-              <a:t>GreenYellow</a:t>
-            </a:r>
-            <a:r>
-              <a:rPr lang="en-US" sz="2200" dirty="0">
-                <a:latin typeface="Helvetica Neue" panose="02000503000000020004" pitchFamily="2" charset="0"/>
-                <a:ea typeface="Helvetica Neue" panose="02000503000000020004" pitchFamily="2" charset="0"/>
-                <a:cs typeface="Helvetica Neue" panose="02000503000000020004" pitchFamily="2" charset="0"/>
-              </a:rPr>
-              <a:t>”, and “Red” channels. Add “DAPI” for “Violet”.</a:t>
-            </a:r>
-          </a:p>
-          <a:p>
-            <a:pPr marL="342900" indent="-342900" fontAlgn="auto">
-              <a:spcBef>
-                <a:spcPts val="0"/>
-              </a:spcBef>
-              <a:spcAft>
-                <a:spcPts val="0"/>
-              </a:spcAft>
-              <a:buClr>
-                <a:schemeClr val="bg1">
-                  <a:lumMod val="50000"/>
-                </a:schemeClr>
-              </a:buClr>
-              <a:buSzPct val="100000"/>
-              <a:buFont typeface="Arial" panose="020B0604020202020204" pitchFamily="34" charset="0"/>
-              <a:buChar char="•"/>
-            </a:pPr>
-            <a:endParaRPr lang="en-US" sz="2200" dirty="0">
-              <a:latin typeface="Helvetica Neue" panose="02000503000000020004" pitchFamily="2" charset="0"/>
-              <a:ea typeface="Helvetica Neue" panose="02000503000000020004" pitchFamily="2" charset="0"/>
-              <a:cs typeface="Helvetica Neue" panose="02000503000000020004" pitchFamily="2" charset="0"/>
-            </a:endParaRPr>
-          </a:p>
-          <a:p>
-            <a:pPr marL="342900" indent="-342900" fontAlgn="auto">
-              <a:spcBef>
-                <a:spcPts val="0"/>
-              </a:spcBef>
-              <a:spcAft>
-                <a:spcPts val="0"/>
-              </a:spcAft>
-              <a:buClr>
-                <a:schemeClr val="bg1">
-                  <a:lumMod val="50000"/>
-                </a:schemeClr>
-              </a:buClr>
-              <a:buSzPct val="100000"/>
-              <a:buFont typeface="Arial" panose="020B0604020202020204" pitchFamily="34" charset="0"/>
-              <a:buChar char="•"/>
-            </a:pPr>
-            <a:r>
-              <a:rPr lang="en-US" sz="2200" dirty="0">
-                <a:latin typeface="Helvetica Neue" panose="02000503000000020004" pitchFamily="2" charset="0"/>
-                <a:ea typeface="Helvetica Neue" panose="02000503000000020004" pitchFamily="2" charset="0"/>
-                <a:cs typeface="Helvetica Neue" panose="02000503000000020004" pitchFamily="2" charset="0"/>
-              </a:rPr>
-              <a:t>Aim to balance excitation and emission efficiencies</a:t>
-            </a:r>
-          </a:p>
-          <a:p>
-            <a:pPr marL="342900" indent="-342900" fontAlgn="auto">
-              <a:spcBef>
-                <a:spcPts val="0"/>
-              </a:spcBef>
-              <a:spcAft>
-                <a:spcPts val="0"/>
-              </a:spcAft>
-              <a:buClr>
-                <a:schemeClr val="bg1">
-                  <a:lumMod val="50000"/>
-                </a:schemeClr>
-              </a:buClr>
-              <a:buSzPct val="100000"/>
-              <a:buFont typeface="Arial" panose="020B0604020202020204" pitchFamily="34" charset="0"/>
-              <a:buChar char="•"/>
-            </a:pPr>
-            <a:endParaRPr lang="en-US" sz="2200" dirty="0">
-              <a:latin typeface="Helvetica Neue" panose="02000503000000020004" pitchFamily="2" charset="0"/>
-              <a:ea typeface="Helvetica Neue" panose="02000503000000020004" pitchFamily="2" charset="0"/>
-              <a:cs typeface="Helvetica Neue" panose="02000503000000020004" pitchFamily="2" charset="0"/>
-            </a:endParaRPr>
-          </a:p>
-        </p:txBody>
-      </p:sp>
-      <p:pic>
-        <p:nvPicPr>
-          <p:cNvPr id="6" name="Picture 5">
-            <a:extLst>
-              <a:ext uri="{FF2B5EF4-FFF2-40B4-BE49-F238E27FC236}">
-                <a16:creationId xmlns:a16="http://schemas.microsoft.com/office/drawing/2014/main" id="{60E2EFA9-3176-5F43-BAD8-C4561123D46C}"/>
-              </a:ext>
-            </a:extLst>
-          </p:cNvPr>
-          <p:cNvPicPr>
-            <a:picLocks noChangeAspect="1"/>
-          </p:cNvPicPr>
-          <p:nvPr/>
-        </p:nvPicPr>
-        <p:blipFill>
-          <a:blip r:embed="rId4"/>
-          <a:stretch>
-            <a:fillRect/>
-          </a:stretch>
-        </p:blipFill>
-        <p:spPr>
-          <a:xfrm>
-            <a:off x="4417899" y="3338914"/>
-            <a:ext cx="2495136" cy="3179456"/>
-          </a:xfrm>
-          <a:prstGeom prst="rect">
-            <a:avLst/>
-          </a:prstGeom>
-        </p:spPr>
-      </p:pic>
-    </p:spTree>
-    <p:extLst>
-      <p:ext uri="{BB962C8B-B14F-4D97-AF65-F5344CB8AC3E}">
-        <p14:creationId xmlns:p14="http://schemas.microsoft.com/office/powerpoint/2010/main" val="1772127626"/>
       </p:ext>
     </p:extLst>
   </p:cSld>

</xml_diff>